<commit_message>
docs: use consistent light background across all presentation slides
</commit_message>
<xml_diff>
--- a/SeatManagementSystem_Presentation.pptx
+++ b/SeatManagementSystem_Presentation.pptx
@@ -1302,7 +1302,7 @@
     <p:bg>
       <p:bgPr>
         <a:solidFill>
-          <a:srgbClr val="1A2D58"/>
+          <a:srgbClr val="F8F9FA"/>
         </a:solidFill>
       </p:bgPr>
     </p:bg>
@@ -1347,7 +1347,7 @@
             <a:r>
               <a:rPr lang="en-US" sz="4800" b="1" dirty="0">
                 <a:solidFill>
-                  <a:srgbClr val="FFFFFF"/>
+                  <a:srgbClr val="1A2D58"/>
                 </a:solidFill>
               </a:rPr>
               <a:t>Seat Management System</a:t>
@@ -1403,743 +1403,10 @@
 <file path=ppt/slides/slide2.xml><?xml version="1.0" encoding="utf-8"?>
 <p:sld xmlns:a="http://schemas.openxmlformats.org/drawingml/2006/main" xmlns:r="http://schemas.openxmlformats.org/officeDocument/2006/relationships" xmlns:p="http://schemas.openxmlformats.org/presentationml/2006/main">
   <p:cSld name="Slide 2">
-    <p:spTree>
-      <p:nvGrpSpPr>
-        <p:cNvPr id="1" name=""/>
-        <p:cNvGrpSpPr/>
-        <p:nvPr/>
-      </p:nvGrpSpPr>
-      <p:grpSpPr>
-        <a:xfrm>
-          <a:off x="0" y="0"/>
-          <a:ext cx="0" cy="0"/>
-          <a:chOff x="0" y="0"/>
-          <a:chExt cx="0" cy="0"/>
-        </a:xfrm>
-      </p:grpSpPr>
-      <p:sp>
-        <p:nvSpPr>
-          <p:cNvPr id="2" name="Text 0"/>
-          <p:cNvSpPr/>
-          <p:nvPr/>
-        </p:nvSpPr>
-        <p:spPr>
-          <a:xfrm>
-            <a:off x="457200" y="457200"/>
-            <a:ext cx="6858000" cy="0"/>
-          </a:xfrm>
-          <a:prstGeom prst="rect">
-            <a:avLst/>
-          </a:prstGeom>
-          <a:noFill/>
-          <a:ln/>
-        </p:spPr>
-        <p:txBody>
-          <a:bodyPr wrap="square" rtlCol="0" anchor="ctr"/>
-          <a:lstStyle/>
-          <a:p>
-            <a:pPr indent="0" marL="0">
-              <a:buNone/>
-            </a:pPr>
-            <a:r>
-              <a:rPr lang="en-US" sz="3200" b="1" dirty="0">
-                <a:solidFill>
-                  <a:srgbClr val="1A2D58"/>
-                </a:solidFill>
-              </a:rPr>
-              <a:t>The Problem</a:t>
-            </a:r>
-            <a:endParaRPr lang="en-US" sz="3200" dirty="0"/>
-          </a:p>
-        </p:txBody>
-      </p:sp>
-      <p:sp>
-        <p:nvSpPr>
-          <p:cNvPr id="3" name="Text 1"/>
-          <p:cNvSpPr/>
-          <p:nvPr/>
-        </p:nvSpPr>
-        <p:spPr>
-          <a:xfrm>
-            <a:off x="457200" y="1371600"/>
-            <a:ext cx="8229600" cy="3200400"/>
-          </a:xfrm>
-          <a:prstGeom prst="rect">
-            <a:avLst/>
-          </a:prstGeom>
-          <a:noFill/>
-          <a:ln/>
-        </p:spPr>
-        <p:txBody>
-          <a:bodyPr wrap="square" rtlCol="0" anchor="ctr"/>
-          <a:lstStyle/>
-          <a:p>
-            <a:pPr indent="0" marL="0">
-              <a:buNone/>
-            </a:pPr>
-            <a:r>
-              <a:rPr lang="en-US" sz="2000" dirty="0">
-                <a:solidFill>
-                  <a:srgbClr val="333333"/>
-                </a:solidFill>
-              </a:rPr>
-              <a:t>• Hybrid work environments lack clear seating visibility.
-</a:t>
-            </a:r>
-            <a:pPr indent="0" marL="0">
-              <a:buNone/>
-            </a:pPr>
-            <a:r>
-              <a:rPr lang="en-US" sz="2000" dirty="0">
-                <a:solidFill>
-                  <a:srgbClr val="333333"/>
-                </a:solidFill>
-              </a:rPr>
-              <a:t>• Inefficient utilization of office space on any given day.
-</a:t>
-            </a:r>
-            <a:pPr indent="0" marL="0">
-              <a:buNone/>
-            </a:pPr>
-            <a:r>
-              <a:rPr lang="en-US" sz="2000" dirty="0">
-                <a:solidFill>
-                  <a:srgbClr val="333333"/>
-                </a:solidFill>
-              </a:rPr>
-              <a:t>• Difficulty coordinating "Office Days" vs "Home Days".
-</a:t>
-            </a:r>
-            <a:pPr indent="0" marL="0">
-              <a:buNone/>
-            </a:pPr>
-            <a:r>
-              <a:rPr lang="en-US" sz="2000" dirty="0">
-                <a:solidFill>
-                  <a:srgbClr val="333333"/>
-                </a:solidFill>
-              </a:rPr>
-              <a:t>• Lack of a streamlined way to book available/unused seats.</a:t>
-            </a:r>
-            <a:endParaRPr lang="en-US" sz="2000" dirty="0"/>
-          </a:p>
-        </p:txBody>
-      </p:sp>
-    </p:spTree>
-  </p:cSld>
-  <p:clrMapOvr>
-    <a:masterClrMapping/>
-  </p:clrMapOvr>
-</p:sld>
-</file>
-
-<file path=ppt/slides/slide3.xml><?xml version="1.0" encoding="utf-8"?>
-<p:sld xmlns:a="http://schemas.openxmlformats.org/drawingml/2006/main" xmlns:r="http://schemas.openxmlformats.org/officeDocument/2006/relationships" xmlns:p="http://schemas.openxmlformats.org/presentationml/2006/main">
-  <p:cSld name="Slide 3">
-    <p:spTree>
-      <p:nvGrpSpPr>
-        <p:cNvPr id="1" name=""/>
-        <p:cNvGrpSpPr/>
-        <p:nvPr/>
-      </p:nvGrpSpPr>
-      <p:grpSpPr>
-        <a:xfrm>
-          <a:off x="0" y="0"/>
-          <a:ext cx="0" cy="0"/>
-          <a:chOff x="0" y="0"/>
-          <a:chExt cx="0" cy="0"/>
-        </a:xfrm>
-      </p:grpSpPr>
-      <p:sp>
-        <p:nvSpPr>
-          <p:cNvPr id="2" name="Text 0"/>
-          <p:cNvSpPr/>
-          <p:nvPr/>
-        </p:nvSpPr>
-        <p:spPr>
-          <a:xfrm>
-            <a:off x="457200" y="457200"/>
-            <a:ext cx="6858000" cy="0"/>
-          </a:xfrm>
-          <a:prstGeom prst="rect">
-            <a:avLst/>
-          </a:prstGeom>
-          <a:noFill/>
-          <a:ln/>
-        </p:spPr>
-        <p:txBody>
-          <a:bodyPr wrap="square" rtlCol="0" anchor="ctr"/>
-          <a:lstStyle/>
-          <a:p>
-            <a:pPr indent="0" marL="0">
-              <a:buNone/>
-            </a:pPr>
-            <a:r>
-              <a:rPr lang="en-US" sz="3200" b="1" dirty="0">
-                <a:solidFill>
-                  <a:srgbClr val="1A2D58"/>
-                </a:solidFill>
-              </a:rPr>
-              <a:t>Our Solution</a:t>
-            </a:r>
-            <a:endParaRPr lang="en-US" sz="3200" dirty="0"/>
-          </a:p>
-        </p:txBody>
-      </p:sp>
-      <p:sp>
-        <p:nvSpPr>
-          <p:cNvPr id="3" name="Text 1"/>
-          <p:cNvSpPr/>
-          <p:nvPr/>
-        </p:nvSpPr>
-        <p:spPr>
-          <a:xfrm>
-            <a:off x="457200" y="1371600"/>
-            <a:ext cx="8229600" cy="3200400"/>
-          </a:xfrm>
-          <a:prstGeom prst="rect">
-            <a:avLst/>
-          </a:prstGeom>
-          <a:noFill/>
-          <a:ln/>
-        </p:spPr>
-        <p:txBody>
-          <a:bodyPr wrap="square" rtlCol="0" anchor="ctr"/>
-          <a:lstStyle/>
-          <a:p>
-            <a:pPr indent="0" marL="0">
-              <a:buNone/>
-            </a:pPr>
-            <a:r>
-              <a:rPr lang="en-US" sz="2000" dirty="0">
-                <a:solidFill>
-                  <a:srgbClr val="333333"/>
-                </a:solidFill>
-              </a:rPr>
-              <a:t>• Dynamic, real-time dashboard reflecting office layout.
-</a:t>
-            </a:r>
-            <a:pPr indent="0" marL="0">
-              <a:buNone/>
-            </a:pPr>
-            <a:r>
-              <a:rPr lang="en-US" sz="2000" dirty="0">
-                <a:solidFill>
-                  <a:srgbClr val="333333"/>
-                </a:solidFill>
-              </a:rPr>
-              <a:t>• Fixed "Batches" and automated seating logic.
-</a:t>
-            </a:r>
-            <a:pPr indent="0" marL="0">
-              <a:buNone/>
-            </a:pPr>
-            <a:r>
-              <a:rPr lang="en-US" sz="2000" dirty="0">
-                <a:solidFill>
-                  <a:srgbClr val="333333"/>
-                </a:solidFill>
-              </a:rPr>
-              <a:t>• One-click seat releases for "Home Day" users.
-</a:t>
-            </a:r>
-            <a:pPr indent="0" marL="0">
-              <a:buNone/>
-            </a:pPr>
-            <a:r>
-              <a:rPr lang="en-US" sz="2000" dirty="0">
-                <a:solidFill>
-                  <a:srgbClr val="333333"/>
-                </a:solidFill>
-              </a:rPr>
-              <a:t>• On-demand Floater Seat booking for flexibility.
-</a:t>
-            </a:r>
-            <a:pPr indent="0" marL="0">
-              <a:buNone/>
-            </a:pPr>
-            <a:r>
-              <a:rPr lang="en-US" sz="2000" dirty="0">
-                <a:solidFill>
-                  <a:srgbClr val="333333"/>
-                </a:solidFill>
-              </a:rPr>
-              <a:t>• Email alerts and OTP verifications for security.</a:t>
-            </a:r>
-            <a:endParaRPr lang="en-US" sz="2000" dirty="0"/>
-          </a:p>
-        </p:txBody>
-      </p:sp>
-    </p:spTree>
-  </p:cSld>
-  <p:clrMapOvr>
-    <a:masterClrMapping/>
-  </p:clrMapOvr>
-</p:sld>
-</file>
-
-<file path=ppt/slides/slide4.xml><?xml version="1.0" encoding="utf-8"?>
-<p:sld xmlns:a="http://schemas.openxmlformats.org/drawingml/2006/main" xmlns:r="http://schemas.openxmlformats.org/officeDocument/2006/relationships" xmlns:p="http://schemas.openxmlformats.org/presentationml/2006/main">
-  <p:cSld name="Slide 4">
-    <p:spTree>
-      <p:nvGrpSpPr>
-        <p:cNvPr id="1" name=""/>
-        <p:cNvGrpSpPr/>
-        <p:nvPr/>
-      </p:nvGrpSpPr>
-      <p:grpSpPr>
-        <a:xfrm>
-          <a:off x="0" y="0"/>
-          <a:ext cx="0" cy="0"/>
-          <a:chOff x="0" y="0"/>
-          <a:chExt cx="0" cy="0"/>
-        </a:xfrm>
-      </p:grpSpPr>
-      <p:sp>
-        <p:nvSpPr>
-          <p:cNvPr id="2" name="Text 0"/>
-          <p:cNvSpPr/>
-          <p:nvPr/>
-        </p:nvSpPr>
-        <p:spPr>
-          <a:xfrm>
-            <a:off x="457200" y="457200"/>
-            <a:ext cx="6858000" cy="0"/>
-          </a:xfrm>
-          <a:prstGeom prst="rect">
-            <a:avLst/>
-          </a:prstGeom>
-          <a:noFill/>
-          <a:ln/>
-        </p:spPr>
-        <p:txBody>
-          <a:bodyPr wrap="square" rtlCol="0" anchor="ctr"/>
-          <a:lstStyle/>
-          <a:p>
-            <a:pPr indent="0" marL="0">
-              <a:buNone/>
-            </a:pPr>
-            <a:r>
-              <a:rPr lang="en-US" sz="3200" b="1" dirty="0">
-                <a:solidFill>
-                  <a:srgbClr val="1A2D58"/>
-                </a:solidFill>
-              </a:rPr>
-              <a:t>Key Features</a:t>
-            </a:r>
-            <a:endParaRPr lang="en-US" sz="3200" dirty="0"/>
-          </a:p>
-        </p:txBody>
-      </p:sp>
-      <p:sp>
-        <p:nvSpPr>
-          <p:cNvPr id="3" name="Text 1"/>
-          <p:cNvSpPr/>
-          <p:nvPr/>
-        </p:nvSpPr>
-        <p:spPr>
-          <a:xfrm>
-            <a:off x="457200" y="1371600"/>
-            <a:ext cx="8229600" cy="3200400"/>
-          </a:xfrm>
-          <a:prstGeom prst="rect">
-            <a:avLst/>
-          </a:prstGeom>
-          <a:noFill/>
-          <a:ln/>
-        </p:spPr>
-        <p:txBody>
-          <a:bodyPr wrap="square" rtlCol="0" anchor="ctr"/>
-          <a:lstStyle/>
-          <a:p>
-            <a:pPr indent="0" marL="0">
-              <a:buNone/>
-            </a:pPr>
-            <a:r>
-              <a:rPr lang="en-US" sz="2000" b="1" dirty="0">
-                <a:solidFill>
-                  <a:srgbClr val="333333"/>
-                </a:solidFill>
-              </a:rPr>
-              <a:t>Secure Authentication</a:t>
-            </a:r>
-            <a:pPr indent="0" marL="0">
-              <a:buNone/>
-            </a:pPr>
-            <a:r>
-              <a:rPr lang="en-US" sz="2000" dirty="0">
-                <a:solidFill>
-                  <a:srgbClr val="333333"/>
-                </a:solidFill>
-              </a:rPr>
-              <a:t> (OTP via Email)
-</a:t>
-            </a:r>
-            <a:pPr indent="0" marL="0">
-              <a:buNone/>
-            </a:pPr>
-            <a:r>
-              <a:rPr lang="en-US" sz="2000" b="1" dirty="0">
-                <a:solidFill>
-                  <a:srgbClr val="333333"/>
-                </a:solidFill>
-              </a:rPr>
-              <a:t>14-Day Advance Booking</a:t>
-            </a:r>
-            <a:pPr indent="0" marL="0">
-              <a:buNone/>
-            </a:pPr>
-            <a:r>
-              <a:rPr lang="en-US" sz="2000" dirty="0">
-                <a:solidFill>
-                  <a:srgbClr val="333333"/>
-                </a:solidFill>
-              </a:rPr>
-              <a:t> (Plan ahead visually)
-</a:t>
-            </a:r>
-            <a:pPr indent="0" marL="0">
-              <a:buNone/>
-            </a:pPr>
-            <a:r>
-              <a:rPr lang="en-US" sz="2000" b="1" dirty="0">
-                <a:solidFill>
-                  <a:srgbClr val="333333"/>
-                </a:solidFill>
-              </a:rPr>
-              <a:t>Visual Seat Map</a:t>
-            </a:r>
-            <a:pPr indent="0" marL="0">
-              <a:buNone/>
-            </a:pPr>
-            <a:r>
-              <a:rPr lang="en-US" sz="2000" dirty="0">
-                <a:solidFill>
-                  <a:srgbClr val="333333"/>
-                </a:solidFill>
-              </a:rPr>
-              <a:t> (Interactive UI with Squad Tables)
-</a:t>
-            </a:r>
-            <a:pPr indent="0" marL="0">
-              <a:buNone/>
-            </a:pPr>
-            <a:r>
-              <a:rPr lang="en-US" sz="2000" b="1" dirty="0">
-                <a:solidFill>
-                  <a:srgbClr val="333333"/>
-                </a:solidFill>
-              </a:rPr>
-              <a:t>Automated Notifications</a:t>
-            </a:r>
-            <a:pPr indent="0" marL="0">
-              <a:buNone/>
-            </a:pPr>
-            <a:r>
-              <a:rPr lang="en-US" sz="2000" dirty="0">
-                <a:solidFill>
-                  <a:srgbClr val="333333"/>
-                </a:solidFill>
-              </a:rPr>
-              <a:t> (Built with Nodemailer)
-</a:t>
-            </a:r>
-            <a:endParaRPr lang="en-US" sz="2000" dirty="0"/>
-          </a:p>
-        </p:txBody>
-      </p:sp>
-    </p:spTree>
-  </p:cSld>
-  <p:clrMapOvr>
-    <a:masterClrMapping/>
-  </p:clrMapOvr>
-</p:sld>
-</file>
-
-<file path=ppt/slides/slide5.xml><?xml version="1.0" encoding="utf-8"?>
-<p:sld xmlns:a="http://schemas.openxmlformats.org/drawingml/2006/main" xmlns:r="http://schemas.openxmlformats.org/officeDocument/2006/relationships" xmlns:p="http://schemas.openxmlformats.org/presentationml/2006/main">
-  <p:cSld name="Slide 5">
-    <p:spTree>
-      <p:nvGrpSpPr>
-        <p:cNvPr id="1" name=""/>
-        <p:cNvGrpSpPr/>
-        <p:nvPr/>
-      </p:nvGrpSpPr>
-      <p:grpSpPr>
-        <a:xfrm>
-          <a:off x="0" y="0"/>
-          <a:ext cx="0" cy="0"/>
-          <a:chOff x="0" y="0"/>
-          <a:chExt cx="0" cy="0"/>
-        </a:xfrm>
-      </p:grpSpPr>
-      <p:sp>
-        <p:nvSpPr>
-          <p:cNvPr id="2" name="Text 0"/>
-          <p:cNvSpPr/>
-          <p:nvPr/>
-        </p:nvSpPr>
-        <p:spPr>
-          <a:xfrm>
-            <a:off x="457200" y="457200"/>
-            <a:ext cx="6858000" cy="0"/>
-          </a:xfrm>
-          <a:prstGeom prst="rect">
-            <a:avLst/>
-          </a:prstGeom>
-          <a:noFill/>
-          <a:ln/>
-        </p:spPr>
-        <p:txBody>
-          <a:bodyPr wrap="square" rtlCol="0" anchor="ctr"/>
-          <a:lstStyle/>
-          <a:p>
-            <a:pPr indent="0" marL="0">
-              <a:buNone/>
-            </a:pPr>
-            <a:r>
-              <a:rPr lang="en-US" sz="3200" b="1" dirty="0">
-                <a:solidFill>
-                  <a:srgbClr val="1A2D58"/>
-                </a:solidFill>
-              </a:rPr>
-              <a:t>Technology Stack</a:t>
-            </a:r>
-            <a:endParaRPr lang="en-US" sz="3200" dirty="0"/>
-          </a:p>
-        </p:txBody>
-      </p:sp>
-      <p:sp>
-        <p:nvSpPr>
-          <p:cNvPr id="3" name="Text 1"/>
-          <p:cNvSpPr/>
-          <p:nvPr/>
-        </p:nvSpPr>
-        <p:spPr>
-          <a:xfrm>
-            <a:off x="457200" y="1371600"/>
-            <a:ext cx="6858000" cy="0"/>
-          </a:xfrm>
-          <a:prstGeom prst="rect">
-            <a:avLst/>
-          </a:prstGeom>
-          <a:noFill/>
-          <a:ln/>
-        </p:spPr>
-        <p:txBody>
-          <a:bodyPr wrap="square" rtlCol="0" anchor="ctr"/>
-          <a:lstStyle/>
-          <a:p>
-            <a:pPr indent="0" marL="0">
-              <a:buNone/>
-            </a:pPr>
-            <a:r>
-              <a:rPr lang="en-US" sz="2400" b="1" dirty="0">
-                <a:solidFill>
-                  <a:srgbClr val="A4133C"/>
-                </a:solidFill>
-              </a:rPr>
-              <a:t>Frontend</a:t>
-            </a:r>
-            <a:endParaRPr lang="en-US" sz="2400" dirty="0"/>
-          </a:p>
-        </p:txBody>
-      </p:sp>
-      <p:sp>
-        <p:nvSpPr>
-          <p:cNvPr id="4" name="Text 2"/>
-          <p:cNvSpPr/>
-          <p:nvPr/>
-        </p:nvSpPr>
-        <p:spPr>
-          <a:xfrm>
-            <a:off x="457200" y="1828800"/>
-            <a:ext cx="8229600" cy="0"/>
-          </a:xfrm>
-          <a:prstGeom prst="rect">
-            <a:avLst/>
-          </a:prstGeom>
-          <a:noFill/>
-          <a:ln/>
-        </p:spPr>
-        <p:txBody>
-          <a:bodyPr wrap="square" rtlCol="0" anchor="ctr"/>
-          <a:lstStyle/>
-          <a:p>
-            <a:pPr indent="0" marL="0">
-              <a:buNone/>
-            </a:pPr>
-            <a:r>
-              <a:rPr lang="en-US" sz="1800" dirty="0">
-                <a:solidFill>
-                  <a:srgbClr val="333333"/>
-                </a:solidFill>
-              </a:rPr>
-              <a:t>React.js, Vite, Vanilla CSS, React Router, Lucide Icons</a:t>
-            </a:r>
-            <a:endParaRPr lang="en-US" sz="1800" dirty="0"/>
-          </a:p>
-        </p:txBody>
-      </p:sp>
-      <p:sp>
-        <p:nvSpPr>
-          <p:cNvPr id="5" name="Text 3"/>
-          <p:cNvSpPr/>
-          <p:nvPr/>
-        </p:nvSpPr>
-        <p:spPr>
-          <a:xfrm>
-            <a:off x="457200" y="2743200"/>
-            <a:ext cx="6858000" cy="0"/>
-          </a:xfrm>
-          <a:prstGeom prst="rect">
-            <a:avLst/>
-          </a:prstGeom>
-          <a:noFill/>
-          <a:ln/>
-        </p:spPr>
-        <p:txBody>
-          <a:bodyPr wrap="square" rtlCol="0" anchor="ctr"/>
-          <a:lstStyle/>
-          <a:p>
-            <a:pPr indent="0" marL="0">
-              <a:buNone/>
-            </a:pPr>
-            <a:r>
-              <a:rPr lang="en-US" sz="2400" b="1" dirty="0">
-                <a:solidFill>
-                  <a:srgbClr val="A4133C"/>
-                </a:solidFill>
-              </a:rPr>
-              <a:t>Backend</a:t>
-            </a:r>
-            <a:endParaRPr lang="en-US" sz="2400" dirty="0"/>
-          </a:p>
-        </p:txBody>
-      </p:sp>
-      <p:sp>
-        <p:nvSpPr>
-          <p:cNvPr id="6" name="Text 4"/>
-          <p:cNvSpPr/>
-          <p:nvPr/>
-        </p:nvSpPr>
-        <p:spPr>
-          <a:xfrm>
-            <a:off x="457200" y="3200400"/>
-            <a:ext cx="8229600" cy="0"/>
-          </a:xfrm>
-          <a:prstGeom prst="rect">
-            <a:avLst/>
-          </a:prstGeom>
-          <a:noFill/>
-          <a:ln/>
-        </p:spPr>
-        <p:txBody>
-          <a:bodyPr wrap="square" rtlCol="0" anchor="ctr"/>
-          <a:lstStyle/>
-          <a:p>
-            <a:pPr indent="0" marL="0">
-              <a:buNone/>
-            </a:pPr>
-            <a:r>
-              <a:rPr lang="en-US" sz="1800" dirty="0">
-                <a:solidFill>
-                  <a:srgbClr val="333333"/>
-                </a:solidFill>
-              </a:rPr>
-              <a:t>Node.js, Express.js, MongoDB + Mongoose</a:t>
-            </a:r>
-            <a:endParaRPr lang="en-US" sz="1800" dirty="0"/>
-          </a:p>
-        </p:txBody>
-      </p:sp>
-      <p:sp>
-        <p:nvSpPr>
-          <p:cNvPr id="7" name="Text 5"/>
-          <p:cNvSpPr/>
-          <p:nvPr/>
-        </p:nvSpPr>
-        <p:spPr>
-          <a:xfrm>
-            <a:off x="457200" y="4114800"/>
-            <a:ext cx="6858000" cy="0"/>
-          </a:xfrm>
-          <a:prstGeom prst="rect">
-            <a:avLst/>
-          </a:prstGeom>
-          <a:noFill/>
-          <a:ln/>
-        </p:spPr>
-        <p:txBody>
-          <a:bodyPr wrap="square" rtlCol="0" anchor="ctr"/>
-          <a:lstStyle/>
-          <a:p>
-            <a:pPr indent="0" marL="0">
-              <a:buNone/>
-            </a:pPr>
-            <a:r>
-              <a:rPr lang="en-US" sz="2400" b="1" dirty="0">
-                <a:solidFill>
-                  <a:srgbClr val="A4133C"/>
-                </a:solidFill>
-              </a:rPr>
-              <a:t>Utilities</a:t>
-            </a:r>
-            <a:endParaRPr lang="en-US" sz="2400" dirty="0"/>
-          </a:p>
-        </p:txBody>
-      </p:sp>
-      <p:sp>
-        <p:nvSpPr>
-          <p:cNvPr id="8" name="Text 6"/>
-          <p:cNvSpPr/>
-          <p:nvPr/>
-        </p:nvSpPr>
-        <p:spPr>
-          <a:xfrm>
-            <a:off x="457200" y="4572000"/>
-            <a:ext cx="8229600" cy="0"/>
-          </a:xfrm>
-          <a:prstGeom prst="rect">
-            <a:avLst/>
-          </a:prstGeom>
-          <a:noFill/>
-          <a:ln/>
-        </p:spPr>
-        <p:txBody>
-          <a:bodyPr wrap="square" rtlCol="0" anchor="ctr"/>
-          <a:lstStyle/>
-          <a:p>
-            <a:pPr indent="0" marL="0">
-              <a:buNone/>
-            </a:pPr>
-            <a:r>
-              <a:rPr lang="en-US" sz="1800" dirty="0">
-                <a:solidFill>
-                  <a:srgbClr val="333333"/>
-                </a:solidFill>
-              </a:rPr>
-              <a:t>Nodemailer, JWT, date-fns, bcrypt</a:t>
-            </a:r>
-            <a:endParaRPr lang="en-US" sz="1800" dirty="0"/>
-          </a:p>
-        </p:txBody>
-      </p:sp>
-    </p:spTree>
-  </p:cSld>
-  <p:clrMapOvr>
-    <a:masterClrMapping/>
-  </p:clrMapOvr>
-</p:sld>
-</file>
-
-<file path=ppt/slides/slide6.xml><?xml version="1.0" encoding="utf-8"?>
-<p:sld xmlns:a="http://schemas.openxmlformats.org/drawingml/2006/main" xmlns:r="http://schemas.openxmlformats.org/officeDocument/2006/relationships" xmlns:p="http://schemas.openxmlformats.org/presentationml/2006/main">
-  <p:cSld name="Slide 6">
     <p:bg>
       <p:bgPr>
         <a:solidFill>
-          <a:srgbClr val="1A2D58"/>
+          <a:srgbClr val="F8F9FA"/>
         </a:solidFill>
       </p:bgPr>
     </p:bg>
@@ -2165,6 +1432,767 @@
         </p:nvSpPr>
         <p:spPr>
           <a:xfrm>
+            <a:off x="457200" y="457200"/>
+            <a:ext cx="6858000" cy="0"/>
+          </a:xfrm>
+          <a:prstGeom prst="rect">
+            <a:avLst/>
+          </a:prstGeom>
+          <a:noFill/>
+          <a:ln/>
+        </p:spPr>
+        <p:txBody>
+          <a:bodyPr wrap="square" rtlCol="0" anchor="ctr"/>
+          <a:lstStyle/>
+          <a:p>
+            <a:pPr indent="0" marL="0">
+              <a:buNone/>
+            </a:pPr>
+            <a:r>
+              <a:rPr lang="en-US" sz="3200" b="1" dirty="0">
+                <a:solidFill>
+                  <a:srgbClr val="1A2D58"/>
+                </a:solidFill>
+              </a:rPr>
+              <a:t>The Problem</a:t>
+            </a:r>
+            <a:endParaRPr lang="en-US" sz="3200" dirty="0"/>
+          </a:p>
+        </p:txBody>
+      </p:sp>
+      <p:sp>
+        <p:nvSpPr>
+          <p:cNvPr id="3" name="Text 1"/>
+          <p:cNvSpPr/>
+          <p:nvPr/>
+        </p:nvSpPr>
+        <p:spPr>
+          <a:xfrm>
+            <a:off x="457200" y="1371600"/>
+            <a:ext cx="8229600" cy="3200400"/>
+          </a:xfrm>
+          <a:prstGeom prst="rect">
+            <a:avLst/>
+          </a:prstGeom>
+          <a:noFill/>
+          <a:ln/>
+        </p:spPr>
+        <p:txBody>
+          <a:bodyPr wrap="square" rtlCol="0" anchor="ctr"/>
+          <a:lstStyle/>
+          <a:p>
+            <a:pPr indent="0" marL="0">
+              <a:buNone/>
+            </a:pPr>
+            <a:r>
+              <a:rPr lang="en-US" sz="2000" dirty="0">
+                <a:solidFill>
+                  <a:srgbClr val="1A1C21"/>
+                </a:solidFill>
+              </a:rPr>
+              <a:t>• Hybrid work environments lack clear seating visibility.
+</a:t>
+            </a:r>
+            <a:pPr indent="0" marL="0">
+              <a:buNone/>
+            </a:pPr>
+            <a:r>
+              <a:rPr lang="en-US" sz="2000" dirty="0">
+                <a:solidFill>
+                  <a:srgbClr val="1A1C21"/>
+                </a:solidFill>
+              </a:rPr>
+              <a:t>• Inefficient utilization of office space on any given day.
+</a:t>
+            </a:r>
+            <a:pPr indent="0" marL="0">
+              <a:buNone/>
+            </a:pPr>
+            <a:r>
+              <a:rPr lang="en-US" sz="2000" dirty="0">
+                <a:solidFill>
+                  <a:srgbClr val="1A1C21"/>
+                </a:solidFill>
+              </a:rPr>
+              <a:t>• Difficulty coordinating "Office Days" vs "Home Days".
+</a:t>
+            </a:r>
+            <a:pPr indent="0" marL="0">
+              <a:buNone/>
+            </a:pPr>
+            <a:r>
+              <a:rPr lang="en-US" sz="2000" dirty="0">
+                <a:solidFill>
+                  <a:srgbClr val="1A1C21"/>
+                </a:solidFill>
+              </a:rPr>
+              <a:t>• Lack of a streamlined way to book available/unused seats.</a:t>
+            </a:r>
+            <a:endParaRPr lang="en-US" sz="2000" dirty="0"/>
+          </a:p>
+        </p:txBody>
+      </p:sp>
+    </p:spTree>
+  </p:cSld>
+  <p:clrMapOvr>
+    <a:masterClrMapping/>
+  </p:clrMapOvr>
+</p:sld>
+</file>
+
+<file path=ppt/slides/slide3.xml><?xml version="1.0" encoding="utf-8"?>
+<p:sld xmlns:a="http://schemas.openxmlformats.org/drawingml/2006/main" xmlns:r="http://schemas.openxmlformats.org/officeDocument/2006/relationships" xmlns:p="http://schemas.openxmlformats.org/presentationml/2006/main">
+  <p:cSld name="Slide 3">
+    <p:bg>
+      <p:bgPr>
+        <a:solidFill>
+          <a:srgbClr val="F8F9FA"/>
+        </a:solidFill>
+      </p:bgPr>
+    </p:bg>
+    <p:spTree>
+      <p:nvGrpSpPr>
+        <p:cNvPr id="1" name=""/>
+        <p:cNvGrpSpPr/>
+        <p:nvPr/>
+      </p:nvGrpSpPr>
+      <p:grpSpPr>
+        <a:xfrm>
+          <a:off x="0" y="0"/>
+          <a:ext cx="0" cy="0"/>
+          <a:chOff x="0" y="0"/>
+          <a:chExt cx="0" cy="0"/>
+        </a:xfrm>
+      </p:grpSpPr>
+      <p:sp>
+        <p:nvSpPr>
+          <p:cNvPr id="2" name="Text 0"/>
+          <p:cNvSpPr/>
+          <p:nvPr/>
+        </p:nvSpPr>
+        <p:spPr>
+          <a:xfrm>
+            <a:off x="457200" y="457200"/>
+            <a:ext cx="6858000" cy="0"/>
+          </a:xfrm>
+          <a:prstGeom prst="rect">
+            <a:avLst/>
+          </a:prstGeom>
+          <a:noFill/>
+          <a:ln/>
+        </p:spPr>
+        <p:txBody>
+          <a:bodyPr wrap="square" rtlCol="0" anchor="ctr"/>
+          <a:lstStyle/>
+          <a:p>
+            <a:pPr indent="0" marL="0">
+              <a:buNone/>
+            </a:pPr>
+            <a:r>
+              <a:rPr lang="en-US" sz="3200" b="1" dirty="0">
+                <a:solidFill>
+                  <a:srgbClr val="1A2D58"/>
+                </a:solidFill>
+              </a:rPr>
+              <a:t>Our Solution</a:t>
+            </a:r>
+            <a:endParaRPr lang="en-US" sz="3200" dirty="0"/>
+          </a:p>
+        </p:txBody>
+      </p:sp>
+      <p:sp>
+        <p:nvSpPr>
+          <p:cNvPr id="3" name="Text 1"/>
+          <p:cNvSpPr/>
+          <p:nvPr/>
+        </p:nvSpPr>
+        <p:spPr>
+          <a:xfrm>
+            <a:off x="457200" y="1371600"/>
+            <a:ext cx="8229600" cy="3200400"/>
+          </a:xfrm>
+          <a:prstGeom prst="rect">
+            <a:avLst/>
+          </a:prstGeom>
+          <a:noFill/>
+          <a:ln/>
+        </p:spPr>
+        <p:txBody>
+          <a:bodyPr wrap="square" rtlCol="0" anchor="ctr"/>
+          <a:lstStyle/>
+          <a:p>
+            <a:pPr indent="0" marL="0">
+              <a:buNone/>
+            </a:pPr>
+            <a:r>
+              <a:rPr lang="en-US" sz="2000" dirty="0">
+                <a:solidFill>
+                  <a:srgbClr val="1A1C21"/>
+                </a:solidFill>
+              </a:rPr>
+              <a:t>• Dynamic, real-time dashboard reflecting office layout.
+</a:t>
+            </a:r>
+            <a:pPr indent="0" marL="0">
+              <a:buNone/>
+            </a:pPr>
+            <a:r>
+              <a:rPr lang="en-US" sz="2000" dirty="0">
+                <a:solidFill>
+                  <a:srgbClr val="1A1C21"/>
+                </a:solidFill>
+              </a:rPr>
+              <a:t>• Fixed "Batches" and automated seating logic.
+</a:t>
+            </a:r>
+            <a:pPr indent="0" marL="0">
+              <a:buNone/>
+            </a:pPr>
+            <a:r>
+              <a:rPr lang="en-US" sz="2000" dirty="0">
+                <a:solidFill>
+                  <a:srgbClr val="1A1C21"/>
+                </a:solidFill>
+              </a:rPr>
+              <a:t>• One-click seat releases for "Home Day" users.
+</a:t>
+            </a:r>
+            <a:pPr indent="0" marL="0">
+              <a:buNone/>
+            </a:pPr>
+            <a:r>
+              <a:rPr lang="en-US" sz="2000" dirty="0">
+                <a:solidFill>
+                  <a:srgbClr val="1A1C21"/>
+                </a:solidFill>
+              </a:rPr>
+              <a:t>• On-demand Floater Seat booking for flexibility.
+</a:t>
+            </a:r>
+            <a:pPr indent="0" marL="0">
+              <a:buNone/>
+            </a:pPr>
+            <a:r>
+              <a:rPr lang="en-US" sz="2000" dirty="0">
+                <a:solidFill>
+                  <a:srgbClr val="1A1C21"/>
+                </a:solidFill>
+              </a:rPr>
+              <a:t>• Email alerts and OTP verifications for security.</a:t>
+            </a:r>
+            <a:endParaRPr lang="en-US" sz="2000" dirty="0"/>
+          </a:p>
+        </p:txBody>
+      </p:sp>
+    </p:spTree>
+  </p:cSld>
+  <p:clrMapOvr>
+    <a:masterClrMapping/>
+  </p:clrMapOvr>
+</p:sld>
+</file>
+
+<file path=ppt/slides/slide4.xml><?xml version="1.0" encoding="utf-8"?>
+<p:sld xmlns:a="http://schemas.openxmlformats.org/drawingml/2006/main" xmlns:r="http://schemas.openxmlformats.org/officeDocument/2006/relationships" xmlns:p="http://schemas.openxmlformats.org/presentationml/2006/main">
+  <p:cSld name="Slide 4">
+    <p:bg>
+      <p:bgPr>
+        <a:solidFill>
+          <a:srgbClr val="F8F9FA"/>
+        </a:solidFill>
+      </p:bgPr>
+    </p:bg>
+    <p:spTree>
+      <p:nvGrpSpPr>
+        <p:cNvPr id="1" name=""/>
+        <p:cNvGrpSpPr/>
+        <p:nvPr/>
+      </p:nvGrpSpPr>
+      <p:grpSpPr>
+        <a:xfrm>
+          <a:off x="0" y="0"/>
+          <a:ext cx="0" cy="0"/>
+          <a:chOff x="0" y="0"/>
+          <a:chExt cx="0" cy="0"/>
+        </a:xfrm>
+      </p:grpSpPr>
+      <p:sp>
+        <p:nvSpPr>
+          <p:cNvPr id="2" name="Text 0"/>
+          <p:cNvSpPr/>
+          <p:nvPr/>
+        </p:nvSpPr>
+        <p:spPr>
+          <a:xfrm>
+            <a:off x="457200" y="457200"/>
+            <a:ext cx="6858000" cy="0"/>
+          </a:xfrm>
+          <a:prstGeom prst="rect">
+            <a:avLst/>
+          </a:prstGeom>
+          <a:noFill/>
+          <a:ln/>
+        </p:spPr>
+        <p:txBody>
+          <a:bodyPr wrap="square" rtlCol="0" anchor="ctr"/>
+          <a:lstStyle/>
+          <a:p>
+            <a:pPr indent="0" marL="0">
+              <a:buNone/>
+            </a:pPr>
+            <a:r>
+              <a:rPr lang="en-US" sz="3200" b="1" dirty="0">
+                <a:solidFill>
+                  <a:srgbClr val="1A2D58"/>
+                </a:solidFill>
+              </a:rPr>
+              <a:t>Key Features</a:t>
+            </a:r>
+            <a:endParaRPr lang="en-US" sz="3200" dirty="0"/>
+          </a:p>
+        </p:txBody>
+      </p:sp>
+      <p:sp>
+        <p:nvSpPr>
+          <p:cNvPr id="3" name="Text 1"/>
+          <p:cNvSpPr/>
+          <p:nvPr/>
+        </p:nvSpPr>
+        <p:spPr>
+          <a:xfrm>
+            <a:off x="457200" y="1371600"/>
+            <a:ext cx="8229600" cy="3200400"/>
+          </a:xfrm>
+          <a:prstGeom prst="rect">
+            <a:avLst/>
+          </a:prstGeom>
+          <a:noFill/>
+          <a:ln/>
+        </p:spPr>
+        <p:txBody>
+          <a:bodyPr wrap="square" rtlCol="0" anchor="ctr"/>
+          <a:lstStyle/>
+          <a:p>
+            <a:pPr indent="0" marL="0">
+              <a:buNone/>
+            </a:pPr>
+            <a:r>
+              <a:rPr lang="en-US" sz="2000" b="1" dirty="0">
+                <a:solidFill>
+                  <a:srgbClr val="1A1C21"/>
+                </a:solidFill>
+              </a:rPr>
+              <a:t>Secure Authentication</a:t>
+            </a:r>
+            <a:pPr indent="0" marL="0">
+              <a:buNone/>
+            </a:pPr>
+            <a:r>
+              <a:rPr lang="en-US" sz="2000" dirty="0">
+                <a:solidFill>
+                  <a:srgbClr val="1A1C21"/>
+                </a:solidFill>
+              </a:rPr>
+              <a:t> (OTP via Email)
+</a:t>
+            </a:r>
+            <a:pPr indent="0" marL="0">
+              <a:buNone/>
+            </a:pPr>
+            <a:r>
+              <a:rPr lang="en-US" sz="2000" b="1" dirty="0">
+                <a:solidFill>
+                  <a:srgbClr val="1A1C21"/>
+                </a:solidFill>
+              </a:rPr>
+              <a:t>14-Day Advance Booking</a:t>
+            </a:r>
+            <a:pPr indent="0" marL="0">
+              <a:buNone/>
+            </a:pPr>
+            <a:r>
+              <a:rPr lang="en-US" sz="2000" dirty="0">
+                <a:solidFill>
+                  <a:srgbClr val="1A1C21"/>
+                </a:solidFill>
+              </a:rPr>
+              <a:t> (Plan ahead visually)
+</a:t>
+            </a:r>
+            <a:pPr indent="0" marL="0">
+              <a:buNone/>
+            </a:pPr>
+            <a:r>
+              <a:rPr lang="en-US" sz="2000" b="1" dirty="0">
+                <a:solidFill>
+                  <a:srgbClr val="1A1C21"/>
+                </a:solidFill>
+              </a:rPr>
+              <a:t>Visual Seat Map</a:t>
+            </a:r>
+            <a:pPr indent="0" marL="0">
+              <a:buNone/>
+            </a:pPr>
+            <a:r>
+              <a:rPr lang="en-US" sz="2000" dirty="0">
+                <a:solidFill>
+                  <a:srgbClr val="1A1C21"/>
+                </a:solidFill>
+              </a:rPr>
+              <a:t> (Interactive UI with Squad Tables)
+</a:t>
+            </a:r>
+            <a:pPr indent="0" marL="0">
+              <a:buNone/>
+            </a:pPr>
+            <a:r>
+              <a:rPr lang="en-US" sz="2000" b="1" dirty="0">
+                <a:solidFill>
+                  <a:srgbClr val="1A1C21"/>
+                </a:solidFill>
+              </a:rPr>
+              <a:t>Automated Notifications</a:t>
+            </a:r>
+            <a:pPr indent="0" marL="0">
+              <a:buNone/>
+            </a:pPr>
+            <a:r>
+              <a:rPr lang="en-US" sz="2000" dirty="0">
+                <a:solidFill>
+                  <a:srgbClr val="1A1C21"/>
+                </a:solidFill>
+              </a:rPr>
+              <a:t> (Built with Nodemailer)
+</a:t>
+            </a:r>
+            <a:endParaRPr lang="en-US" sz="2000" dirty="0"/>
+          </a:p>
+        </p:txBody>
+      </p:sp>
+    </p:spTree>
+  </p:cSld>
+  <p:clrMapOvr>
+    <a:masterClrMapping/>
+  </p:clrMapOvr>
+</p:sld>
+</file>
+
+<file path=ppt/slides/slide5.xml><?xml version="1.0" encoding="utf-8"?>
+<p:sld xmlns:a="http://schemas.openxmlformats.org/drawingml/2006/main" xmlns:r="http://schemas.openxmlformats.org/officeDocument/2006/relationships" xmlns:p="http://schemas.openxmlformats.org/presentationml/2006/main">
+  <p:cSld name="Slide 5">
+    <p:bg>
+      <p:bgPr>
+        <a:solidFill>
+          <a:srgbClr val="F8F9FA"/>
+        </a:solidFill>
+      </p:bgPr>
+    </p:bg>
+    <p:spTree>
+      <p:nvGrpSpPr>
+        <p:cNvPr id="1" name=""/>
+        <p:cNvGrpSpPr/>
+        <p:nvPr/>
+      </p:nvGrpSpPr>
+      <p:grpSpPr>
+        <a:xfrm>
+          <a:off x="0" y="0"/>
+          <a:ext cx="0" cy="0"/>
+          <a:chOff x="0" y="0"/>
+          <a:chExt cx="0" cy="0"/>
+        </a:xfrm>
+      </p:grpSpPr>
+      <p:sp>
+        <p:nvSpPr>
+          <p:cNvPr id="2" name="Text 0"/>
+          <p:cNvSpPr/>
+          <p:nvPr/>
+        </p:nvSpPr>
+        <p:spPr>
+          <a:xfrm>
+            <a:off x="457200" y="457200"/>
+            <a:ext cx="6858000" cy="0"/>
+          </a:xfrm>
+          <a:prstGeom prst="rect">
+            <a:avLst/>
+          </a:prstGeom>
+          <a:noFill/>
+          <a:ln/>
+        </p:spPr>
+        <p:txBody>
+          <a:bodyPr wrap="square" rtlCol="0" anchor="ctr"/>
+          <a:lstStyle/>
+          <a:p>
+            <a:pPr indent="0" marL="0">
+              <a:buNone/>
+            </a:pPr>
+            <a:r>
+              <a:rPr lang="en-US" sz="3200" b="1" dirty="0">
+                <a:solidFill>
+                  <a:srgbClr val="1A2D58"/>
+                </a:solidFill>
+              </a:rPr>
+              <a:t>Technology Stack</a:t>
+            </a:r>
+            <a:endParaRPr lang="en-US" sz="3200" dirty="0"/>
+          </a:p>
+        </p:txBody>
+      </p:sp>
+      <p:sp>
+        <p:nvSpPr>
+          <p:cNvPr id="3" name="Text 1"/>
+          <p:cNvSpPr/>
+          <p:nvPr/>
+        </p:nvSpPr>
+        <p:spPr>
+          <a:xfrm>
+            <a:off x="457200" y="1371600"/>
+            <a:ext cx="6858000" cy="0"/>
+          </a:xfrm>
+          <a:prstGeom prst="rect">
+            <a:avLst/>
+          </a:prstGeom>
+          <a:noFill/>
+          <a:ln/>
+        </p:spPr>
+        <p:txBody>
+          <a:bodyPr wrap="square" rtlCol="0" anchor="ctr"/>
+          <a:lstStyle/>
+          <a:p>
+            <a:pPr indent="0" marL="0">
+              <a:buNone/>
+            </a:pPr>
+            <a:r>
+              <a:rPr lang="en-US" sz="2400" b="1" dirty="0">
+                <a:solidFill>
+                  <a:srgbClr val="A4133C"/>
+                </a:solidFill>
+              </a:rPr>
+              <a:t>Frontend</a:t>
+            </a:r>
+            <a:endParaRPr lang="en-US" sz="2400" dirty="0"/>
+          </a:p>
+        </p:txBody>
+      </p:sp>
+      <p:sp>
+        <p:nvSpPr>
+          <p:cNvPr id="4" name="Text 2"/>
+          <p:cNvSpPr/>
+          <p:nvPr/>
+        </p:nvSpPr>
+        <p:spPr>
+          <a:xfrm>
+            <a:off x="457200" y="1828800"/>
+            <a:ext cx="8229600" cy="0"/>
+          </a:xfrm>
+          <a:prstGeom prst="rect">
+            <a:avLst/>
+          </a:prstGeom>
+          <a:noFill/>
+          <a:ln/>
+        </p:spPr>
+        <p:txBody>
+          <a:bodyPr wrap="square" rtlCol="0" anchor="ctr"/>
+          <a:lstStyle/>
+          <a:p>
+            <a:pPr indent="0" marL="0">
+              <a:buNone/>
+            </a:pPr>
+            <a:r>
+              <a:rPr lang="en-US" sz="1800" dirty="0">
+                <a:solidFill>
+                  <a:srgbClr val="6B7280"/>
+                </a:solidFill>
+              </a:rPr>
+              <a:t>React.js, Vite, Vanilla CSS, React Router, Lucide Icons</a:t>
+            </a:r>
+            <a:endParaRPr lang="en-US" sz="1800" dirty="0"/>
+          </a:p>
+        </p:txBody>
+      </p:sp>
+      <p:sp>
+        <p:nvSpPr>
+          <p:cNvPr id="5" name="Text 3"/>
+          <p:cNvSpPr/>
+          <p:nvPr/>
+        </p:nvSpPr>
+        <p:spPr>
+          <a:xfrm>
+            <a:off x="457200" y="2743200"/>
+            <a:ext cx="6858000" cy="0"/>
+          </a:xfrm>
+          <a:prstGeom prst="rect">
+            <a:avLst/>
+          </a:prstGeom>
+          <a:noFill/>
+          <a:ln/>
+        </p:spPr>
+        <p:txBody>
+          <a:bodyPr wrap="square" rtlCol="0" anchor="ctr"/>
+          <a:lstStyle/>
+          <a:p>
+            <a:pPr indent="0" marL="0">
+              <a:buNone/>
+            </a:pPr>
+            <a:r>
+              <a:rPr lang="en-US" sz="2400" b="1" dirty="0">
+                <a:solidFill>
+                  <a:srgbClr val="A4133C"/>
+                </a:solidFill>
+              </a:rPr>
+              <a:t>Backend</a:t>
+            </a:r>
+            <a:endParaRPr lang="en-US" sz="2400" dirty="0"/>
+          </a:p>
+        </p:txBody>
+      </p:sp>
+      <p:sp>
+        <p:nvSpPr>
+          <p:cNvPr id="6" name="Text 4"/>
+          <p:cNvSpPr/>
+          <p:nvPr/>
+        </p:nvSpPr>
+        <p:spPr>
+          <a:xfrm>
+            <a:off x="457200" y="3200400"/>
+            <a:ext cx="8229600" cy="0"/>
+          </a:xfrm>
+          <a:prstGeom prst="rect">
+            <a:avLst/>
+          </a:prstGeom>
+          <a:noFill/>
+          <a:ln/>
+        </p:spPr>
+        <p:txBody>
+          <a:bodyPr wrap="square" rtlCol="0" anchor="ctr"/>
+          <a:lstStyle/>
+          <a:p>
+            <a:pPr indent="0" marL="0">
+              <a:buNone/>
+            </a:pPr>
+            <a:r>
+              <a:rPr lang="en-US" sz="1800" dirty="0">
+                <a:solidFill>
+                  <a:srgbClr val="6B7280"/>
+                </a:solidFill>
+              </a:rPr>
+              <a:t>Node.js, Express.js, MongoDB + Mongoose</a:t>
+            </a:r>
+            <a:endParaRPr lang="en-US" sz="1800" dirty="0"/>
+          </a:p>
+        </p:txBody>
+      </p:sp>
+      <p:sp>
+        <p:nvSpPr>
+          <p:cNvPr id="7" name="Text 5"/>
+          <p:cNvSpPr/>
+          <p:nvPr/>
+        </p:nvSpPr>
+        <p:spPr>
+          <a:xfrm>
+            <a:off x="457200" y="4114800"/>
+            <a:ext cx="6858000" cy="0"/>
+          </a:xfrm>
+          <a:prstGeom prst="rect">
+            <a:avLst/>
+          </a:prstGeom>
+          <a:noFill/>
+          <a:ln/>
+        </p:spPr>
+        <p:txBody>
+          <a:bodyPr wrap="square" rtlCol="0" anchor="ctr"/>
+          <a:lstStyle/>
+          <a:p>
+            <a:pPr indent="0" marL="0">
+              <a:buNone/>
+            </a:pPr>
+            <a:r>
+              <a:rPr lang="en-US" sz="2400" b="1" dirty="0">
+                <a:solidFill>
+                  <a:srgbClr val="A4133C"/>
+                </a:solidFill>
+              </a:rPr>
+              <a:t>Utilities</a:t>
+            </a:r>
+            <a:endParaRPr lang="en-US" sz="2400" dirty="0"/>
+          </a:p>
+        </p:txBody>
+      </p:sp>
+      <p:sp>
+        <p:nvSpPr>
+          <p:cNvPr id="8" name="Text 6"/>
+          <p:cNvSpPr/>
+          <p:nvPr/>
+        </p:nvSpPr>
+        <p:spPr>
+          <a:xfrm>
+            <a:off x="457200" y="4572000"/>
+            <a:ext cx="8229600" cy="0"/>
+          </a:xfrm>
+          <a:prstGeom prst="rect">
+            <a:avLst/>
+          </a:prstGeom>
+          <a:noFill/>
+          <a:ln/>
+        </p:spPr>
+        <p:txBody>
+          <a:bodyPr wrap="square" rtlCol="0" anchor="ctr"/>
+          <a:lstStyle/>
+          <a:p>
+            <a:pPr indent="0" marL="0">
+              <a:buNone/>
+            </a:pPr>
+            <a:r>
+              <a:rPr lang="en-US" sz="1800" dirty="0">
+                <a:solidFill>
+                  <a:srgbClr val="6B7280"/>
+                </a:solidFill>
+              </a:rPr>
+              <a:t>Nodemailer, JWT, date-fns, bcrypt</a:t>
+            </a:r>
+            <a:endParaRPr lang="en-US" sz="1800" dirty="0"/>
+          </a:p>
+        </p:txBody>
+      </p:sp>
+    </p:spTree>
+  </p:cSld>
+  <p:clrMapOvr>
+    <a:masterClrMapping/>
+  </p:clrMapOvr>
+</p:sld>
+</file>
+
+<file path=ppt/slides/slide6.xml><?xml version="1.0" encoding="utf-8"?>
+<p:sld xmlns:a="http://schemas.openxmlformats.org/drawingml/2006/main" xmlns:r="http://schemas.openxmlformats.org/officeDocument/2006/relationships" xmlns:p="http://schemas.openxmlformats.org/presentationml/2006/main">
+  <p:cSld name="Slide 6">
+    <p:bg>
+      <p:bgPr>
+        <a:solidFill>
+          <a:srgbClr val="F8F9FA"/>
+        </a:solidFill>
+      </p:bgPr>
+    </p:bg>
+    <p:spTree>
+      <p:nvGrpSpPr>
+        <p:cNvPr id="1" name=""/>
+        <p:cNvGrpSpPr/>
+        <p:nvPr/>
+      </p:nvGrpSpPr>
+      <p:grpSpPr>
+        <a:xfrm>
+          <a:off x="0" y="0"/>
+          <a:ext cx="0" cy="0"/>
+          <a:chOff x="0" y="0"/>
+          <a:chExt cx="0" cy="0"/>
+        </a:xfrm>
+      </p:grpSpPr>
+      <p:sp>
+        <p:nvSpPr>
+          <p:cNvPr id="2" name="Text 0"/>
+          <p:cNvSpPr/>
+          <p:nvPr/>
+        </p:nvSpPr>
+        <p:spPr>
+          <a:xfrm>
             <a:off x="0" y="2286000"/>
             <a:ext cx="9144000" cy="1371600"/>
           </a:xfrm>
@@ -2184,7 +2212,7 @@
             <a:r>
               <a:rPr lang="en-US" sz="4800" b="1" dirty="0">
                 <a:solidFill>
-                  <a:srgbClr val="FFFFFF"/>
+                  <a:srgbClr val="1A2D58"/>
                 </a:solidFill>
               </a:rPr>
               <a:t>Thank You!</a:t>

</xml_diff>